<commit_message>
Finished commenting on code, updated the project flowchart images and presentation.
</commit_message>
<xml_diff>
--- a/Project Flowchart Presentation.pptx
+++ b/Project Flowchart Presentation.pptx
@@ -105,6 +105,11 @@
       </a:defRPr>
     </a:lvl9pPr>
   </p:defaultTextStyle>
+  <p:extLst>
+    <p:ext uri="{EFAFB233-063F-42B5-8137-9DF3F51BA10A}">
+      <p15:sldGuideLst xmlns:p15="http://schemas.microsoft.com/office/powerpoint/2012/main"/>
+    </p:ext>
+  </p:extLst>
 </p:presentation>
 </file>
 
@@ -257,7 +262,7 @@
           <a:p>
             <a:fld id="{982BAA36-AD0B-4822-89EB-87AC8DE1656D}" type="datetimeFigureOut">
               <a:rPr lang="en-IE" smtClean="0"/>
-              <a:t>02/12/2020</a:t>
+              <a:t>06/01/2021</a:t>
             </a:fld>
             <a:endParaRPr lang="en-IE"/>
           </a:p>
@@ -457,7 +462,7 @@
           <a:p>
             <a:fld id="{982BAA36-AD0B-4822-89EB-87AC8DE1656D}" type="datetimeFigureOut">
               <a:rPr lang="en-IE" smtClean="0"/>
-              <a:t>02/12/2020</a:t>
+              <a:t>06/01/2021</a:t>
             </a:fld>
             <a:endParaRPr lang="en-IE"/>
           </a:p>
@@ -667,7 +672,7 @@
           <a:p>
             <a:fld id="{982BAA36-AD0B-4822-89EB-87AC8DE1656D}" type="datetimeFigureOut">
               <a:rPr lang="en-IE" smtClean="0"/>
-              <a:t>02/12/2020</a:t>
+              <a:t>06/01/2021</a:t>
             </a:fld>
             <a:endParaRPr lang="en-IE"/>
           </a:p>
@@ -867,7 +872,7 @@
           <a:p>
             <a:fld id="{982BAA36-AD0B-4822-89EB-87AC8DE1656D}" type="datetimeFigureOut">
               <a:rPr lang="en-IE" smtClean="0"/>
-              <a:t>02/12/2020</a:t>
+              <a:t>06/01/2021</a:t>
             </a:fld>
             <a:endParaRPr lang="en-IE"/>
           </a:p>
@@ -1143,7 +1148,7 @@
           <a:p>
             <a:fld id="{982BAA36-AD0B-4822-89EB-87AC8DE1656D}" type="datetimeFigureOut">
               <a:rPr lang="en-IE" smtClean="0"/>
-              <a:t>02/12/2020</a:t>
+              <a:t>06/01/2021</a:t>
             </a:fld>
             <a:endParaRPr lang="en-IE"/>
           </a:p>
@@ -1411,7 +1416,7 @@
           <a:p>
             <a:fld id="{982BAA36-AD0B-4822-89EB-87AC8DE1656D}" type="datetimeFigureOut">
               <a:rPr lang="en-IE" smtClean="0"/>
-              <a:t>02/12/2020</a:t>
+              <a:t>06/01/2021</a:t>
             </a:fld>
             <a:endParaRPr lang="en-IE"/>
           </a:p>
@@ -1826,7 +1831,7 @@
           <a:p>
             <a:fld id="{982BAA36-AD0B-4822-89EB-87AC8DE1656D}" type="datetimeFigureOut">
               <a:rPr lang="en-IE" smtClean="0"/>
-              <a:t>02/12/2020</a:t>
+              <a:t>06/01/2021</a:t>
             </a:fld>
             <a:endParaRPr lang="en-IE"/>
           </a:p>
@@ -1968,7 +1973,7 @@
           <a:p>
             <a:fld id="{982BAA36-AD0B-4822-89EB-87AC8DE1656D}" type="datetimeFigureOut">
               <a:rPr lang="en-IE" smtClean="0"/>
-              <a:t>02/12/2020</a:t>
+              <a:t>06/01/2021</a:t>
             </a:fld>
             <a:endParaRPr lang="en-IE"/>
           </a:p>
@@ -2081,7 +2086,7 @@
           <a:p>
             <a:fld id="{982BAA36-AD0B-4822-89EB-87AC8DE1656D}" type="datetimeFigureOut">
               <a:rPr lang="en-IE" smtClean="0"/>
-              <a:t>02/12/2020</a:t>
+              <a:t>06/01/2021</a:t>
             </a:fld>
             <a:endParaRPr lang="en-IE"/>
           </a:p>
@@ -2394,7 +2399,7 @@
           <a:p>
             <a:fld id="{982BAA36-AD0B-4822-89EB-87AC8DE1656D}" type="datetimeFigureOut">
               <a:rPr lang="en-IE" smtClean="0"/>
-              <a:t>02/12/2020</a:t>
+              <a:t>06/01/2021</a:t>
             </a:fld>
             <a:endParaRPr lang="en-IE"/>
           </a:p>
@@ -2683,7 +2688,7 @@
           <a:p>
             <a:fld id="{982BAA36-AD0B-4822-89EB-87AC8DE1656D}" type="datetimeFigureOut">
               <a:rPr lang="en-IE" smtClean="0"/>
-              <a:t>02/12/2020</a:t>
+              <a:t>06/01/2021</a:t>
             </a:fld>
             <a:endParaRPr lang="en-IE"/>
           </a:p>
@@ -2926,7 +2931,7 @@
           <a:p>
             <a:fld id="{982BAA36-AD0B-4822-89EB-87AC8DE1656D}" type="datetimeFigureOut">
               <a:rPr lang="en-IE" smtClean="0"/>
-              <a:t>02/12/2020</a:t>
+              <a:t>06/01/2021</a:t>
             </a:fld>
             <a:endParaRPr lang="en-IE"/>
           </a:p>
@@ -3467,13 +3472,13 @@
   <p:clrMapOvr>
     <a:masterClrMapping/>
   </p:clrMapOvr>
-  <mc:AlternateContent xmlns:mc="http://schemas.openxmlformats.org/markup-compatibility/2006">
-    <mc:Choice xmlns:p14="http://schemas.microsoft.com/office/powerpoint/2010/main" Requires="p14">
+  <mc:AlternateContent xmlns:mc="http://schemas.openxmlformats.org/markup-compatibility/2006" xmlns:p14="http://schemas.microsoft.com/office/powerpoint/2010/main">
+    <mc:Choice Requires="p14">
       <p:transition spd="med" p14:dur="700">
         <p:fade/>
       </p:transition>
     </mc:Choice>
-    <mc:Fallback>
+    <mc:Fallback xmlns="">
       <p:transition spd="med">
         <p:fade/>
       </p:transition>
@@ -3501,7 +3506,7 @@
       </p:grpSpPr>
       <p:pic>
         <p:nvPicPr>
-          <p:cNvPr id="3" name="Picture 2" descr="Diagram, schematic&#10;&#10;Description automatically generated">
+          <p:cNvPr id="3" name="Picture 2">
             <a:extLst>
               <a:ext uri="{FF2B5EF4-FFF2-40B4-BE49-F238E27FC236}">
                 <a16:creationId xmlns:a16="http://schemas.microsoft.com/office/drawing/2014/main" id="{A2E1C0DE-97D5-42F7-86EF-4A7706338046}"/>
@@ -3513,7 +3518,7 @@
           </p:cNvPicPr>
           <p:nvPr/>
         </p:nvPicPr>
-        <p:blipFill rotWithShape="1">
+        <p:blipFill>
           <a:blip r:embed="rId2">
             <a:extLst>
               <a:ext uri="{28A0092B-C50C-407E-A947-70E740481C1C}">
@@ -3521,7 +3526,7 @@
               </a:ext>
             </a:extLst>
           </a:blip>
-          <a:srcRect t="3467" b="2400"/>
+          <a:srcRect t="3198" b="3198"/>
           <a:stretch/>
         </p:blipFill>
         <p:spPr>
@@ -3882,7 +3887,7 @@
         </p:nvSpPr>
         <p:spPr>
           <a:xfrm>
-            <a:off x="1057105" y="3195010"/>
+            <a:off x="1057105" y="3182487"/>
             <a:ext cx="10472237" cy="646331"/>
           </a:xfrm>
           <a:prstGeom prst="rect">
@@ -3912,7 +3917,7 @@
                   </a:schemeClr>
                 </a:solidFill>
               </a:rPr>
-              <a:t>Sense HAT Humidity Sensor controls Humidifier</a:t>
+              <a:t>Sense HAT Temp Sensor controls Heater</a:t>
             </a:r>
           </a:p>
         </p:txBody>
@@ -3931,7 +3936,7 @@
         </p:nvSpPr>
         <p:spPr>
           <a:xfrm>
-            <a:off x="1155717" y="3244084"/>
+            <a:off x="1191210" y="3207532"/>
             <a:ext cx="10472237" cy="646331"/>
           </a:xfrm>
           <a:prstGeom prst="rect">
@@ -3961,7 +3966,7 @@
                   </a:schemeClr>
                 </a:solidFill>
               </a:rPr>
-              <a:t>Temp &amp; Humidity Data Sent to Blynk App</a:t>
+              <a:t>Temp Data Sent to Blynk App</a:t>
             </a:r>
           </a:p>
         </p:txBody>
@@ -3980,7 +3985,7 @@
         </p:nvSpPr>
         <p:spPr>
           <a:xfrm>
-            <a:off x="1240516" y="3207533"/>
+            <a:off x="1254329" y="3179591"/>
             <a:ext cx="10472237" cy="646331"/>
           </a:xfrm>
           <a:prstGeom prst="rect">
@@ -4010,7 +4015,7 @@
                   </a:schemeClr>
                 </a:solidFill>
               </a:rPr>
-              <a:t>Manual control of Humidifier from Blynk App</a:t>
+              <a:t>Manual control of Heater from Blynk App</a:t>
             </a:r>
           </a:p>
         </p:txBody>
@@ -4025,13 +4030,13 @@
   <p:clrMapOvr>
     <a:masterClrMapping/>
   </p:clrMapOvr>
-  <mc:AlternateContent xmlns:mc="http://schemas.openxmlformats.org/markup-compatibility/2006">
-    <mc:Choice xmlns:p14="http://schemas.microsoft.com/office/powerpoint/2010/main" Requires="p14">
+  <mc:AlternateContent xmlns:mc="http://schemas.openxmlformats.org/markup-compatibility/2006" xmlns:p14="http://schemas.microsoft.com/office/powerpoint/2010/main">
+    <mc:Choice Requires="p14">
       <p:transition spd="med" p14:dur="700">
         <p:fade/>
       </p:transition>
     </mc:Choice>
-    <mc:Fallback>
+    <mc:Fallback xmlns="">
       <p:transition spd="med">
         <p:fade/>
       </p:transition>

</xml_diff>

<commit_message>
Revert "Finished commenting on code, updated the project flowchart images and presentation."
This reverts commit 2e3e50ff5337ebafe07af60b7be74102fa1a4e11.
</commit_message>
<xml_diff>
--- a/Project Flowchart Presentation.pptx
+++ b/Project Flowchart Presentation.pptx
@@ -105,11 +105,6 @@
       </a:defRPr>
     </a:lvl9pPr>
   </p:defaultTextStyle>
-  <p:extLst>
-    <p:ext uri="{EFAFB233-063F-42B5-8137-9DF3F51BA10A}">
-      <p15:sldGuideLst xmlns:p15="http://schemas.microsoft.com/office/powerpoint/2012/main"/>
-    </p:ext>
-  </p:extLst>
 </p:presentation>
 </file>
 
@@ -262,7 +257,7 @@
           <a:p>
             <a:fld id="{982BAA36-AD0B-4822-89EB-87AC8DE1656D}" type="datetimeFigureOut">
               <a:rPr lang="en-IE" smtClean="0"/>
-              <a:t>06/01/2021</a:t>
+              <a:t>02/12/2020</a:t>
             </a:fld>
             <a:endParaRPr lang="en-IE"/>
           </a:p>
@@ -462,7 +457,7 @@
           <a:p>
             <a:fld id="{982BAA36-AD0B-4822-89EB-87AC8DE1656D}" type="datetimeFigureOut">
               <a:rPr lang="en-IE" smtClean="0"/>
-              <a:t>06/01/2021</a:t>
+              <a:t>02/12/2020</a:t>
             </a:fld>
             <a:endParaRPr lang="en-IE"/>
           </a:p>
@@ -672,7 +667,7 @@
           <a:p>
             <a:fld id="{982BAA36-AD0B-4822-89EB-87AC8DE1656D}" type="datetimeFigureOut">
               <a:rPr lang="en-IE" smtClean="0"/>
-              <a:t>06/01/2021</a:t>
+              <a:t>02/12/2020</a:t>
             </a:fld>
             <a:endParaRPr lang="en-IE"/>
           </a:p>
@@ -872,7 +867,7 @@
           <a:p>
             <a:fld id="{982BAA36-AD0B-4822-89EB-87AC8DE1656D}" type="datetimeFigureOut">
               <a:rPr lang="en-IE" smtClean="0"/>
-              <a:t>06/01/2021</a:t>
+              <a:t>02/12/2020</a:t>
             </a:fld>
             <a:endParaRPr lang="en-IE"/>
           </a:p>
@@ -1148,7 +1143,7 @@
           <a:p>
             <a:fld id="{982BAA36-AD0B-4822-89EB-87AC8DE1656D}" type="datetimeFigureOut">
               <a:rPr lang="en-IE" smtClean="0"/>
-              <a:t>06/01/2021</a:t>
+              <a:t>02/12/2020</a:t>
             </a:fld>
             <a:endParaRPr lang="en-IE"/>
           </a:p>
@@ -1416,7 +1411,7 @@
           <a:p>
             <a:fld id="{982BAA36-AD0B-4822-89EB-87AC8DE1656D}" type="datetimeFigureOut">
               <a:rPr lang="en-IE" smtClean="0"/>
-              <a:t>06/01/2021</a:t>
+              <a:t>02/12/2020</a:t>
             </a:fld>
             <a:endParaRPr lang="en-IE"/>
           </a:p>
@@ -1831,7 +1826,7 @@
           <a:p>
             <a:fld id="{982BAA36-AD0B-4822-89EB-87AC8DE1656D}" type="datetimeFigureOut">
               <a:rPr lang="en-IE" smtClean="0"/>
-              <a:t>06/01/2021</a:t>
+              <a:t>02/12/2020</a:t>
             </a:fld>
             <a:endParaRPr lang="en-IE"/>
           </a:p>
@@ -1973,7 +1968,7 @@
           <a:p>
             <a:fld id="{982BAA36-AD0B-4822-89EB-87AC8DE1656D}" type="datetimeFigureOut">
               <a:rPr lang="en-IE" smtClean="0"/>
-              <a:t>06/01/2021</a:t>
+              <a:t>02/12/2020</a:t>
             </a:fld>
             <a:endParaRPr lang="en-IE"/>
           </a:p>
@@ -2086,7 +2081,7 @@
           <a:p>
             <a:fld id="{982BAA36-AD0B-4822-89EB-87AC8DE1656D}" type="datetimeFigureOut">
               <a:rPr lang="en-IE" smtClean="0"/>
-              <a:t>06/01/2021</a:t>
+              <a:t>02/12/2020</a:t>
             </a:fld>
             <a:endParaRPr lang="en-IE"/>
           </a:p>
@@ -2399,7 +2394,7 @@
           <a:p>
             <a:fld id="{982BAA36-AD0B-4822-89EB-87AC8DE1656D}" type="datetimeFigureOut">
               <a:rPr lang="en-IE" smtClean="0"/>
-              <a:t>06/01/2021</a:t>
+              <a:t>02/12/2020</a:t>
             </a:fld>
             <a:endParaRPr lang="en-IE"/>
           </a:p>
@@ -2688,7 +2683,7 @@
           <a:p>
             <a:fld id="{982BAA36-AD0B-4822-89EB-87AC8DE1656D}" type="datetimeFigureOut">
               <a:rPr lang="en-IE" smtClean="0"/>
-              <a:t>06/01/2021</a:t>
+              <a:t>02/12/2020</a:t>
             </a:fld>
             <a:endParaRPr lang="en-IE"/>
           </a:p>
@@ -2931,7 +2926,7 @@
           <a:p>
             <a:fld id="{982BAA36-AD0B-4822-89EB-87AC8DE1656D}" type="datetimeFigureOut">
               <a:rPr lang="en-IE" smtClean="0"/>
-              <a:t>06/01/2021</a:t>
+              <a:t>02/12/2020</a:t>
             </a:fld>
             <a:endParaRPr lang="en-IE"/>
           </a:p>
@@ -3472,13 +3467,13 @@
   <p:clrMapOvr>
     <a:masterClrMapping/>
   </p:clrMapOvr>
-  <mc:AlternateContent xmlns:mc="http://schemas.openxmlformats.org/markup-compatibility/2006" xmlns:p14="http://schemas.microsoft.com/office/powerpoint/2010/main">
-    <mc:Choice Requires="p14">
+  <mc:AlternateContent xmlns:mc="http://schemas.openxmlformats.org/markup-compatibility/2006">
+    <mc:Choice xmlns:p14="http://schemas.microsoft.com/office/powerpoint/2010/main" Requires="p14">
       <p:transition spd="med" p14:dur="700">
         <p:fade/>
       </p:transition>
     </mc:Choice>
-    <mc:Fallback xmlns="">
+    <mc:Fallback>
       <p:transition spd="med">
         <p:fade/>
       </p:transition>
@@ -3506,7 +3501,7 @@
       </p:grpSpPr>
       <p:pic>
         <p:nvPicPr>
-          <p:cNvPr id="3" name="Picture 2">
+          <p:cNvPr id="3" name="Picture 2" descr="Diagram, schematic&#10;&#10;Description automatically generated">
             <a:extLst>
               <a:ext uri="{FF2B5EF4-FFF2-40B4-BE49-F238E27FC236}">
                 <a16:creationId xmlns:a16="http://schemas.microsoft.com/office/drawing/2014/main" id="{A2E1C0DE-97D5-42F7-86EF-4A7706338046}"/>
@@ -3518,7 +3513,7 @@
           </p:cNvPicPr>
           <p:nvPr/>
         </p:nvPicPr>
-        <p:blipFill>
+        <p:blipFill rotWithShape="1">
           <a:blip r:embed="rId2">
             <a:extLst>
               <a:ext uri="{28A0092B-C50C-407E-A947-70E740481C1C}">
@@ -3526,7 +3521,7 @@
               </a:ext>
             </a:extLst>
           </a:blip>
-          <a:srcRect t="3198" b="3198"/>
+          <a:srcRect t="3467" b="2400"/>
           <a:stretch/>
         </p:blipFill>
         <p:spPr>
@@ -3887,7 +3882,7 @@
         </p:nvSpPr>
         <p:spPr>
           <a:xfrm>
-            <a:off x="1057105" y="3182487"/>
+            <a:off x="1057105" y="3195010"/>
             <a:ext cx="10472237" cy="646331"/>
           </a:xfrm>
           <a:prstGeom prst="rect">
@@ -3917,7 +3912,7 @@
                   </a:schemeClr>
                 </a:solidFill>
               </a:rPr>
-              <a:t>Sense HAT Temp Sensor controls Heater</a:t>
+              <a:t>Sense HAT Humidity Sensor controls Humidifier</a:t>
             </a:r>
           </a:p>
         </p:txBody>
@@ -3936,7 +3931,7 @@
         </p:nvSpPr>
         <p:spPr>
           <a:xfrm>
-            <a:off x="1191210" y="3207532"/>
+            <a:off x="1155717" y="3244084"/>
             <a:ext cx="10472237" cy="646331"/>
           </a:xfrm>
           <a:prstGeom prst="rect">
@@ -3966,7 +3961,7 @@
                   </a:schemeClr>
                 </a:solidFill>
               </a:rPr>
-              <a:t>Temp Data Sent to Blynk App</a:t>
+              <a:t>Temp &amp; Humidity Data Sent to Blynk App</a:t>
             </a:r>
           </a:p>
         </p:txBody>
@@ -3985,7 +3980,7 @@
         </p:nvSpPr>
         <p:spPr>
           <a:xfrm>
-            <a:off x="1254329" y="3179591"/>
+            <a:off x="1240516" y="3207533"/>
             <a:ext cx="10472237" cy="646331"/>
           </a:xfrm>
           <a:prstGeom prst="rect">
@@ -4015,7 +4010,7 @@
                   </a:schemeClr>
                 </a:solidFill>
               </a:rPr>
-              <a:t>Manual control of Heater from Blynk App</a:t>
+              <a:t>Manual control of Humidifier from Blynk App</a:t>
             </a:r>
           </a:p>
         </p:txBody>
@@ -4030,13 +4025,13 @@
   <p:clrMapOvr>
     <a:masterClrMapping/>
   </p:clrMapOvr>
-  <mc:AlternateContent xmlns:mc="http://schemas.openxmlformats.org/markup-compatibility/2006" xmlns:p14="http://schemas.microsoft.com/office/powerpoint/2010/main">
-    <mc:Choice Requires="p14">
+  <mc:AlternateContent xmlns:mc="http://schemas.openxmlformats.org/markup-compatibility/2006">
+    <mc:Choice xmlns:p14="http://schemas.microsoft.com/office/powerpoint/2010/main" Requires="p14">
       <p:transition spd="med" p14:dur="700">
         <p:fade/>
       </p:transition>
     </mc:Choice>
-    <mc:Fallback xmlns="">
+    <mc:Fallback>
       <p:transition spd="med">
         <p:fade/>
       </p:transition>

</xml_diff>

<commit_message>
Updated Flowchart Image and Presentation
</commit_message>
<xml_diff>
--- a/Project Flowchart Presentation.pptx
+++ b/Project Flowchart Presentation.pptx
@@ -105,6 +105,11 @@
       </a:defRPr>
     </a:lvl9pPr>
   </p:defaultTextStyle>
+  <p:extLst>
+    <p:ext uri="{EFAFB233-063F-42B5-8137-9DF3F51BA10A}">
+      <p15:sldGuideLst xmlns:p15="http://schemas.microsoft.com/office/powerpoint/2012/main"/>
+    </p:ext>
+  </p:extLst>
 </p:presentation>
 </file>
 
@@ -257,7 +262,7 @@
           <a:p>
             <a:fld id="{982BAA36-AD0B-4822-89EB-87AC8DE1656D}" type="datetimeFigureOut">
               <a:rPr lang="en-IE" smtClean="0"/>
-              <a:t>02/12/2020</a:t>
+              <a:t>07/01/2021</a:t>
             </a:fld>
             <a:endParaRPr lang="en-IE"/>
           </a:p>
@@ -457,7 +462,7 @@
           <a:p>
             <a:fld id="{982BAA36-AD0B-4822-89EB-87AC8DE1656D}" type="datetimeFigureOut">
               <a:rPr lang="en-IE" smtClean="0"/>
-              <a:t>02/12/2020</a:t>
+              <a:t>07/01/2021</a:t>
             </a:fld>
             <a:endParaRPr lang="en-IE"/>
           </a:p>
@@ -667,7 +672,7 @@
           <a:p>
             <a:fld id="{982BAA36-AD0B-4822-89EB-87AC8DE1656D}" type="datetimeFigureOut">
               <a:rPr lang="en-IE" smtClean="0"/>
-              <a:t>02/12/2020</a:t>
+              <a:t>07/01/2021</a:t>
             </a:fld>
             <a:endParaRPr lang="en-IE"/>
           </a:p>
@@ -867,7 +872,7 @@
           <a:p>
             <a:fld id="{982BAA36-AD0B-4822-89EB-87AC8DE1656D}" type="datetimeFigureOut">
               <a:rPr lang="en-IE" smtClean="0"/>
-              <a:t>02/12/2020</a:t>
+              <a:t>07/01/2021</a:t>
             </a:fld>
             <a:endParaRPr lang="en-IE"/>
           </a:p>
@@ -1143,7 +1148,7 @@
           <a:p>
             <a:fld id="{982BAA36-AD0B-4822-89EB-87AC8DE1656D}" type="datetimeFigureOut">
               <a:rPr lang="en-IE" smtClean="0"/>
-              <a:t>02/12/2020</a:t>
+              <a:t>07/01/2021</a:t>
             </a:fld>
             <a:endParaRPr lang="en-IE"/>
           </a:p>
@@ -1411,7 +1416,7 @@
           <a:p>
             <a:fld id="{982BAA36-AD0B-4822-89EB-87AC8DE1656D}" type="datetimeFigureOut">
               <a:rPr lang="en-IE" smtClean="0"/>
-              <a:t>02/12/2020</a:t>
+              <a:t>07/01/2021</a:t>
             </a:fld>
             <a:endParaRPr lang="en-IE"/>
           </a:p>
@@ -1826,7 +1831,7 @@
           <a:p>
             <a:fld id="{982BAA36-AD0B-4822-89EB-87AC8DE1656D}" type="datetimeFigureOut">
               <a:rPr lang="en-IE" smtClean="0"/>
-              <a:t>02/12/2020</a:t>
+              <a:t>07/01/2021</a:t>
             </a:fld>
             <a:endParaRPr lang="en-IE"/>
           </a:p>
@@ -1968,7 +1973,7 @@
           <a:p>
             <a:fld id="{982BAA36-AD0B-4822-89EB-87AC8DE1656D}" type="datetimeFigureOut">
               <a:rPr lang="en-IE" smtClean="0"/>
-              <a:t>02/12/2020</a:t>
+              <a:t>07/01/2021</a:t>
             </a:fld>
             <a:endParaRPr lang="en-IE"/>
           </a:p>
@@ -2081,7 +2086,7 @@
           <a:p>
             <a:fld id="{982BAA36-AD0B-4822-89EB-87AC8DE1656D}" type="datetimeFigureOut">
               <a:rPr lang="en-IE" smtClean="0"/>
-              <a:t>02/12/2020</a:t>
+              <a:t>07/01/2021</a:t>
             </a:fld>
             <a:endParaRPr lang="en-IE"/>
           </a:p>
@@ -2394,7 +2399,7 @@
           <a:p>
             <a:fld id="{982BAA36-AD0B-4822-89EB-87AC8DE1656D}" type="datetimeFigureOut">
               <a:rPr lang="en-IE" smtClean="0"/>
-              <a:t>02/12/2020</a:t>
+              <a:t>07/01/2021</a:t>
             </a:fld>
             <a:endParaRPr lang="en-IE"/>
           </a:p>
@@ -2683,7 +2688,7 @@
           <a:p>
             <a:fld id="{982BAA36-AD0B-4822-89EB-87AC8DE1656D}" type="datetimeFigureOut">
               <a:rPr lang="en-IE" smtClean="0"/>
-              <a:t>02/12/2020</a:t>
+              <a:t>07/01/2021</a:t>
             </a:fld>
             <a:endParaRPr lang="en-IE"/>
           </a:p>
@@ -2926,7 +2931,7 @@
           <a:p>
             <a:fld id="{982BAA36-AD0B-4822-89EB-87AC8DE1656D}" type="datetimeFigureOut">
               <a:rPr lang="en-IE" smtClean="0"/>
-              <a:t>02/12/2020</a:t>
+              <a:t>07/01/2021</a:t>
             </a:fld>
             <a:endParaRPr lang="en-IE"/>
           </a:p>
@@ -3467,13 +3472,13 @@
   <p:clrMapOvr>
     <a:masterClrMapping/>
   </p:clrMapOvr>
-  <mc:AlternateContent xmlns:mc="http://schemas.openxmlformats.org/markup-compatibility/2006">
-    <mc:Choice xmlns:p14="http://schemas.microsoft.com/office/powerpoint/2010/main" Requires="p14">
+  <mc:AlternateContent xmlns:mc="http://schemas.openxmlformats.org/markup-compatibility/2006" xmlns:p14="http://schemas.microsoft.com/office/powerpoint/2010/main">
+    <mc:Choice Requires="p14">
       <p:transition spd="med" p14:dur="700">
         <p:fade/>
       </p:transition>
     </mc:Choice>
-    <mc:Fallback>
+    <mc:Fallback xmlns="">
       <p:transition spd="med">
         <p:fade/>
       </p:transition>
@@ -3501,7 +3506,7 @@
       </p:grpSpPr>
       <p:pic>
         <p:nvPicPr>
-          <p:cNvPr id="3" name="Picture 2" descr="Diagram, schematic&#10;&#10;Description automatically generated">
+          <p:cNvPr id="3" name="Picture 2">
             <a:extLst>
               <a:ext uri="{FF2B5EF4-FFF2-40B4-BE49-F238E27FC236}">
                 <a16:creationId xmlns:a16="http://schemas.microsoft.com/office/drawing/2014/main" id="{A2E1C0DE-97D5-42F7-86EF-4A7706338046}"/>
@@ -3513,7 +3518,7 @@
           </p:cNvPicPr>
           <p:nvPr/>
         </p:nvPicPr>
-        <p:blipFill rotWithShape="1">
+        <p:blipFill>
           <a:blip r:embed="rId2">
             <a:extLst>
               <a:ext uri="{28A0092B-C50C-407E-A947-70E740481C1C}">
@@ -3521,7 +3526,7 @@
               </a:ext>
             </a:extLst>
           </a:blip>
-          <a:srcRect t="3467" b="2400"/>
+          <a:srcRect t="727" b="727"/>
           <a:stretch/>
         </p:blipFill>
         <p:spPr>
@@ -3912,7 +3917,7 @@
                   </a:schemeClr>
                 </a:solidFill>
               </a:rPr>
-              <a:t>Sense HAT Humidity Sensor controls Humidifier</a:t>
+              <a:t>Sense HAT Temp Sensor controls Heater</a:t>
             </a:r>
           </a:p>
         </p:txBody>
@@ -3931,7 +3936,7 @@
         </p:nvSpPr>
         <p:spPr>
           <a:xfrm>
-            <a:off x="1155717" y="3244084"/>
+            <a:off x="1191210" y="3146398"/>
             <a:ext cx="10472237" cy="646331"/>
           </a:xfrm>
           <a:prstGeom prst="rect">
@@ -3961,7 +3966,7 @@
                   </a:schemeClr>
                 </a:solidFill>
               </a:rPr>
-              <a:t>Temp &amp; Humidity Data Sent to Blynk App</a:t>
+              <a:t>Temp Data Sent to Blynk App</a:t>
             </a:r>
           </a:p>
         </p:txBody>
@@ -3980,7 +3985,7 @@
         </p:nvSpPr>
         <p:spPr>
           <a:xfrm>
-            <a:off x="1240516" y="3207533"/>
+            <a:off x="1325315" y="3207532"/>
             <a:ext cx="10472237" cy="646331"/>
           </a:xfrm>
           <a:prstGeom prst="rect">
@@ -4010,7 +4015,7 @@
                   </a:schemeClr>
                 </a:solidFill>
               </a:rPr>
-              <a:t>Manual control of Humidifier from Blynk App</a:t>
+              <a:t>Manual control of Heater from Blynk App</a:t>
             </a:r>
           </a:p>
         </p:txBody>
@@ -4025,13 +4030,13 @@
   <p:clrMapOvr>
     <a:masterClrMapping/>
   </p:clrMapOvr>
-  <mc:AlternateContent xmlns:mc="http://schemas.openxmlformats.org/markup-compatibility/2006">
-    <mc:Choice xmlns:p14="http://schemas.microsoft.com/office/powerpoint/2010/main" Requires="p14">
+  <mc:AlternateContent xmlns:mc="http://schemas.openxmlformats.org/markup-compatibility/2006" xmlns:p14="http://schemas.microsoft.com/office/powerpoint/2010/main">
+    <mc:Choice Requires="p14">
       <p:transition spd="med" p14:dur="700">
         <p:fade/>
       </p:transition>
     </mc:Choice>
-    <mc:Fallback>
+    <mc:Fallback xmlns="">
       <p:transition spd="med">
         <p:fade/>
       </p:transition>

</xml_diff>